<commit_message>
- File "startup.tml" is added - Presentation is updated
</commit_message>
<xml_diff>
--- a/resource/document/MetaOutput - Preview.pptx
+++ b/resource/document/MetaOutput - Preview.pptx
@@ -3360,21 +3360,20 @@
         </p:nvPicPr>
         <p:blipFill rotWithShape="1">
           <a:blip r:embed="rId4"/>
-          <a:srcRect r="920"/>
-          <a:stretch>
-            <a:fillRect/>
-          </a:stretch>
+          <a:srcRect l="10" r="912"/>
+          <a:stretch/>
         </p:blipFill>
         <p:spPr>
           <a:xfrm>
-            <a:off x="1350613" y="1941311"/>
+            <a:off x="1350000" y="1941311"/>
             <a:ext cx="8701200" cy="2286000"/>
           </a:xfrm>
           <a:prstGeom prst="rect">
             <a:avLst/>
           </a:prstGeom>
           <a:effectLst>
-            <a:reflection blurRad="6350" stA="44000" endPos="30000" dist="101600" dir="5400000" sy="-100000" algn="bl" rotWithShape="0"/>
+            <a:reflection blurRad="6350" stA="40000" endPos="30000" dist="101600" dir="5400000" sy="-100000" algn="bl" rotWithShape="0"/>
+            <a:softEdge rad="0"/>
           </a:effectLst>
           <a:scene3d>
             <a:camera prst="perspectiveFront">
@@ -3382,7 +3381,11 @@
             </a:camera>
             <a:lightRig rig="threePt" dir="t"/>
           </a:scene3d>
-          <a:sp3d prstMaterial="flat"/>
+          <a:sp3d extrusionH="12700">
+            <a:extrusionClr>
+              <a:schemeClr val="tx1"/>
+            </a:extrusionClr>
+          </a:sp3d>
         </p:spPr>
       </p:pic>
     </p:spTree>

</xml_diff>